<commit_message>
Trial for taking user path added
</commit_message>
<xml_diff>
--- a/Python_test_template.pptx
+++ b/Python_test_template.pptx
@@ -3133,7 +3133,7 @@
           </a:p>
           <a:p>
             <a:r>
-              <a:t>Date : 08/11/2022 14:57:50</a:t>
+              <a:t>Date : 09/11/2022 11:15:46</a:t>
             </a:r>
           </a:p>
         </p:txBody>
@@ -3161,7 +3161,7 @@
           <a:lstStyle/>
           <a:p>
             <a:r>
-              <a:t> Worker Wanda -08/11/2022 14:57:50</a:t>
+              <a:t> Worker Wanda -09/11/2022 11:15:46</a:t>
             </a:r>
           </a:p>
         </p:txBody>
@@ -3228,7 +3228,7 @@
           <a:lstStyle/>
           <a:p>
             <a:r>
-              <a:t> Worker Wanda -08/11/2022 14:57:50</a:t>
+              <a:t> Worker Wanda -09/11/2022 11:15:46</a:t>
             </a:r>
           </a:p>
         </p:txBody>
@@ -3461,7 +3461,7 @@
           <a:lstStyle/>
           <a:p>
             <a:r>
-              <a:t> Worker Wanda -08/11/2022 14:57:50</a:t>
+              <a:t> Worker Wanda -09/11/2022 11:15:46</a:t>
             </a:r>
           </a:p>
         </p:txBody>
@@ -3576,7 +3576,7 @@
           <a:lstStyle/>
           <a:p>
             <a:r>
-              <a:t> Worker Wanda -08/11/2022 14:57:50</a:t>
+              <a:t> Worker Wanda -09/11/2022 11:15:46</a:t>
             </a:r>
           </a:p>
         </p:txBody>

</xml_diff>